<commit_message>
fix typos in Week 9
</commit_message>
<xml_diff>
--- a/Week 9 -- Movement models/Lecture 9 -- models with movement.pptx
+++ b/Week 9 -- Movement models/Lecture 9 -- models with movement.pptx
@@ -220,7 +220,7 @@
           <a:p>
             <a:fld id="{1522831B-4FE3-4D45-950B-0D2C6BB2DD76}" type="datetimeFigureOut">
               <a:rPr lang="en-US" smtClean="0"/>
-              <a:t>5/30/2016</a:t>
+              <a:t>5/31/2016</a:t>
             </a:fld>
             <a:endParaRPr lang="en-US"/>
           </a:p>
@@ -3570,8 +3570,8 @@
           </a:p>
         </p:txBody>
       </p:sp>
-      <mc:AlternateContent xmlns:mc="http://schemas.openxmlformats.org/markup-compatibility/2006" xmlns:a14="http://schemas.microsoft.com/office/drawing/2010/main">
-        <mc:Choice Requires="a14">
+      <mc:AlternateContent xmlns:mc="http://schemas.openxmlformats.org/markup-compatibility/2006">
+        <mc:Choice xmlns:a14="http://schemas.microsoft.com/office/drawing/2010/main" Requires="a14">
           <p:sp>
             <p:nvSpPr>
               <p:cNvPr id="3" name="Content Placeholder 2"/>
@@ -3845,6 +3845,19 @@
                           <a:latin typeface="Cambria Math" panose="02040503050406030204" pitchFamily="18" charset="0"/>
                         </a:rPr>
                         <m:t>𝐀</m:t>
+                      </m:r>
+                      <m:r>
+                        <a:rPr lang="en-US" i="1">
+                          <a:latin typeface="Cambria Math" panose="02040503050406030204" pitchFamily="18" charset="0"/>
+                        </a:rPr>
+                        <m:t>∆</m:t>
+                      </m:r>
+                      <m:r>
+                        <a:rPr lang="en-US" i="1">
+                          <a:latin typeface="Cambria Math" panose="02040503050406030204" pitchFamily="18" charset="0"/>
+                          <a:ea typeface="Cambria Math" panose="02040503050406030204" pitchFamily="18" charset="0"/>
+                        </a:rPr>
+                        <m:t>𝑡</m:t>
                       </m:r>
                       <m:r>
                         <a:rPr lang="en-US" b="0" i="1" smtClean="0">
@@ -3903,7 +3916,7 @@
             </p:txBody>
           </p:sp>
         </mc:Choice>
-        <mc:Fallback xmlns="">
+        <mc:Fallback>
           <p:sp>
             <p:nvSpPr>
               <p:cNvPr id="3" name="Content Placeholder 2"/>
@@ -3947,6 +3960,13 @@
   <p:clrMapOvr>
     <a:masterClrMapping/>
   </p:clrMapOvr>
+  <p:timing>
+    <p:tnLst>
+      <p:par>
+        <p:cTn id="1" dur="indefinite" restart="never" nodeType="tmRoot"/>
+      </p:par>
+    </p:tnLst>
+  </p:timing>
 </p:sld>
 </file>
 
@@ -4207,6 +4227,13 @@
   <p:clrMapOvr>
     <a:masterClrMapping/>
   </p:clrMapOvr>
+  <p:timing>
+    <p:tnLst>
+      <p:par>
+        <p:cTn id="1" dur="indefinite" restart="never" nodeType="tmRoot"/>
+      </p:par>
+    </p:tnLst>
+  </p:timing>
 </p:sld>
 </file>
 
@@ -4920,8 +4947,8 @@
           </p:sp>
         </mc:Fallback>
       </mc:AlternateContent>
-      <mc:AlternateContent xmlns:mc="http://schemas.openxmlformats.org/markup-compatibility/2006">
-        <mc:Choice xmlns:a14="http://schemas.microsoft.com/office/drawing/2010/main" Requires="a14">
+      <mc:AlternateContent xmlns:mc="http://schemas.openxmlformats.org/markup-compatibility/2006" xmlns:a14="http://schemas.microsoft.com/office/drawing/2010/main">
+        <mc:Choice Requires="a14">
           <p:sp>
             <p:nvSpPr>
               <p:cNvPr id="20" name="TextBox 19"/>
@@ -5151,7 +5178,7 @@
             </p:txBody>
           </p:sp>
         </mc:Choice>
-        <mc:Fallback>
+        <mc:Fallback xmlns="">
           <p:sp>
             <p:nvSpPr>
               <p:cNvPr id="20" name="TextBox 19"/>
@@ -6836,8 +6863,8 @@
           </p:sp>
         </mc:Fallback>
       </mc:AlternateContent>
-      <mc:AlternateContent xmlns:mc="http://schemas.openxmlformats.org/markup-compatibility/2006">
-        <mc:Choice xmlns:a14="http://schemas.microsoft.com/office/drawing/2010/main" Requires="a14">
+      <mc:AlternateContent xmlns:mc="http://schemas.openxmlformats.org/markup-compatibility/2006" xmlns:a14="http://schemas.microsoft.com/office/drawing/2010/main">
+        <mc:Choice Requires="a14">
           <p:sp>
             <p:nvSpPr>
               <p:cNvPr id="20" name="TextBox 19"/>
@@ -7612,7 +7639,7 @@
             </p:txBody>
           </p:sp>
         </mc:Choice>
-        <mc:Fallback>
+        <mc:Fallback xmlns="">
           <p:sp>
             <p:nvSpPr>
               <p:cNvPr id="20" name="TextBox 19"/>
@@ -12680,8 +12707,8 @@
           </p:sp>
         </mc:Fallback>
       </mc:AlternateContent>
-      <mc:AlternateContent xmlns:mc="http://schemas.openxmlformats.org/markup-compatibility/2006">
-        <mc:Choice xmlns:a14="http://schemas.microsoft.com/office/drawing/2010/main" Requires="a14">
+      <mc:AlternateContent xmlns:mc="http://schemas.openxmlformats.org/markup-compatibility/2006" xmlns:a14="http://schemas.microsoft.com/office/drawing/2010/main">
+        <mc:Choice Requires="a14">
           <p:sp>
             <p:nvSpPr>
               <p:cNvPr id="48" name="TextBox 47"/>
@@ -13444,7 +13471,7 @@
             </p:txBody>
           </p:sp>
         </mc:Choice>
-        <mc:Fallback>
+        <mc:Fallback xmlns="">
           <p:sp>
             <p:nvSpPr>
               <p:cNvPr id="48" name="TextBox 47"/>
@@ -15279,8 +15306,8 @@
           </a:p>
         </p:txBody>
       </p:sp>
-      <mc:AlternateContent xmlns:mc="http://schemas.openxmlformats.org/markup-compatibility/2006">
-        <mc:Choice xmlns:a14="http://schemas.microsoft.com/office/drawing/2010/main" Requires="a14">
+      <mc:AlternateContent xmlns:mc="http://schemas.openxmlformats.org/markup-compatibility/2006" xmlns:a14="http://schemas.microsoft.com/office/drawing/2010/main">
+        <mc:Choice Requires="a14">
           <p:sp>
             <p:nvSpPr>
               <p:cNvPr id="6" name="Content Placeholder 2"/>
@@ -15559,7 +15586,7 @@
                               <a:latin typeface="Cambria Math"/>
                               <a:ea typeface="Cambria Math"/>
                             </a:rPr>
-                            <m:t>∇</m:t>
+                            <m:t>𝛻</m:t>
                           </m:r>
                           <m:r>
                             <a:rPr lang="en-US" b="1" i="1">
@@ -15573,7 +15600,7 @@
                               <a:latin typeface="Cambria Math"/>
                               <a:ea typeface="Cambria Math"/>
                             </a:rPr>
-                            <m:t>∇</m:t>
+                            <m:t>𝛻</m:t>
                           </m:r>
                           <m:r>
                             <a:rPr lang="en-US" b="1" i="1">
@@ -15594,7 +15621,7 @@
                               <a:latin typeface="Cambria Math"/>
                               <a:ea typeface="Cambria Math"/>
                             </a:rPr>
-                            <m:t>∇</m:t>
+                            <m:t>𝛻</m:t>
                           </m:r>
                         </m:e>
                       </m:d>
@@ -15682,7 +15709,7 @@
                           <a:latin typeface="Cambria Math"/>
                           <a:ea typeface="Cambria Math"/>
                         </a:rPr>
-                        <m:t>∇</m:t>
+                        <m:t>𝛻</m:t>
                       </m:r>
                       <m:r>
                         <a:rPr lang="en-US" b="1" i="0">
@@ -15696,7 +15723,7 @@
                           <a:latin typeface="Cambria Math"/>
                           <a:ea typeface="Cambria Math"/>
                         </a:rPr>
-                        <m:t>∇</m:t>
+                        <m:t>𝛻</m:t>
                       </m:r>
                       <m:r>
                         <a:rPr lang="en-US" b="1" i="0">
@@ -15717,7 +15744,7 @@
                           <a:latin typeface="Cambria Math"/>
                           <a:ea typeface="Cambria Math"/>
                         </a:rPr>
-                        <m:t>∇</m:t>
+                        <m:t>𝛻</m:t>
                       </m:r>
                       <m:r>
                         <a:rPr lang="en-US" b="1" i="1" smtClean="0">
@@ -15951,7 +15978,7 @@
             </p:txBody>
           </p:sp>
         </mc:Choice>
-        <mc:Fallback>
+        <mc:Fallback xmlns="">
           <p:sp>
             <p:nvSpPr>
               <p:cNvPr id="6" name="Content Placeholder 2"/>
@@ -17293,8 +17320,8 @@
           </a:p>
         </p:txBody>
       </p:sp>
-      <mc:AlternateContent xmlns:mc="http://schemas.openxmlformats.org/markup-compatibility/2006" xmlns:a14="http://schemas.microsoft.com/office/drawing/2010/main">
-        <mc:Choice Requires="a14">
+      <mc:AlternateContent xmlns:mc="http://schemas.openxmlformats.org/markup-compatibility/2006">
+        <mc:Choice xmlns:a14="http://schemas.microsoft.com/office/drawing/2010/main" Requires="a14">
           <p:sp>
             <p:nvSpPr>
               <p:cNvPr id="3" name="Content Placeholder 2"/>
@@ -17816,17 +17843,17 @@
                             <m:accPr>
                               <m:chr m:val="̂"/>
                               <m:ctrlPr>
-                                <a:rPr lang="en-US" b="1" i="1" smtClean="0">
+                                <a:rPr lang="en-US" b="1" smtClean="0">
                                   <a:latin typeface="Cambria Math" panose="02040503050406030204" pitchFamily="18" charset="0"/>
                                 </a:rPr>
                               </m:ctrlPr>
                             </m:accPr>
                             <m:e>
                               <m:r>
-                                <a:rPr lang="en-US" b="1" i="1">
+                                <a:rPr lang="en-US" b="1" i="0">
                                   <a:latin typeface="Cambria Math"/>
                                 </a:rPr>
-                                <m:t>𝒅</m:t>
+                                <m:t>𝐝</m:t>
                               </m:r>
                             </m:e>
                           </m:acc>
@@ -17883,10 +17910,10 @@
                             </m:sSubPr>
                             <m:e>
                               <m:r>
-                                <a:rPr lang="en-US" b="1" i="1">
+                                <a:rPr lang="en-US" b="1" i="0">
                                   <a:latin typeface="Cambria Math"/>
                                 </a:rPr>
-                                <m:t>𝒅</m:t>
+                                <m:t>𝐝</m:t>
                               </m:r>
                             </m:e>
                             <m:sub>
@@ -17979,10 +18006,10 @@
                                 </m:sSubPr>
                                 <m:e>
                                   <m:r>
-                                    <a:rPr lang="en-US" b="1" i="1">
+                                    <a:rPr lang="en-US" b="1" i="0">
                                       <a:latin typeface="Cambria Math"/>
                                     </a:rPr>
-                                    <m:t>𝒅</m:t>
+                                    <m:t>𝐝</m:t>
                                   </m:r>
                                 </m:e>
                                 <m:sub>
@@ -18029,11 +18056,11 @@
                     </m:oMathParaPr>
                     <m:oMath xmlns:m="http://schemas.openxmlformats.org/officeDocument/2006/math">
                       <m:r>
-                        <a:rPr lang="en-US" b="1" i="1">
+                        <a:rPr lang="en-US" b="1" i="0">
                           <a:latin typeface="Cambria Math"/>
                           <a:ea typeface="Cambria Math"/>
                         </a:rPr>
-                        <m:t>𝝎</m:t>
+                        <m:t>𝛚</m:t>
                       </m:r>
                       <m:r>
                         <a:rPr lang="en-US" b="1" i="1">
@@ -18043,11 +18070,14 @@
                         <m:t>~</m:t>
                       </m:r>
                       <m:r>
-                        <a:rPr lang="en-US" b="1" i="1">
-                          <a:latin typeface="Cambria Math"/>
+                        <m:rPr>
+                          <m:sty m:val="p"/>
+                        </m:rPr>
+                        <a:rPr lang="en-US" b="0" i="0" smtClean="0">
+                          <a:latin typeface="Cambria Math" panose="02040503050406030204" pitchFamily="18" charset="0"/>
                           <a:ea typeface="Cambria Math"/>
                         </a:rPr>
-                        <m:t>𝑮𝑹𝑭</m:t>
+                        <m:t>MVN</m:t>
                       </m:r>
                       <m:r>
                         <a:rPr lang="en-US" b="1" i="1">
@@ -18150,11 +18180,11 @@
                             <m:t>(</m:t>
                           </m:r>
                           <m:r>
-                            <a:rPr lang="en-US" b="1" i="1" smtClean="0">
+                            <a:rPr lang="en-US" b="1" i="0" smtClean="0">
                               <a:latin typeface="Cambria Math"/>
                               <a:ea typeface="Cambria Math"/>
                             </a:rPr>
-                            <m:t>𝒅</m:t>
+                            <m:t>𝐝</m:t>
                           </m:r>
                         </m:e>
                         <m:sub>
@@ -18182,11 +18212,14 @@
                         <m:t>~</m:t>
                       </m:r>
                       <m:r>
-                        <a:rPr lang="en-US" b="1" i="1">
-                          <a:latin typeface="Cambria Math"/>
+                        <m:rPr>
+                          <m:sty m:val="p"/>
+                        </m:rPr>
+                        <a:rPr lang="en-US" b="0" i="0" smtClean="0">
+                          <a:latin typeface="Cambria Math" panose="02040503050406030204" pitchFamily="18" charset="0"/>
                           <a:ea typeface="Cambria Math"/>
                         </a:rPr>
-                        <m:t>𝑮𝑹𝑭</m:t>
+                        <m:t>MVN</m:t>
                       </m:r>
                       <m:r>
                         <a:rPr lang="en-US" b="1" i="1">
@@ -18232,10 +18265,10 @@
                             </m:accPr>
                             <m:e>
                               <m:r>
-                                <a:rPr lang="en-US" b="1" i="1">
+                                <a:rPr lang="en-US" b="1" i="0">
                                   <a:latin typeface="Cambria Math"/>
                                 </a:rPr>
-                                <m:t>𝒅</m:t>
+                                <m:t>𝐝</m:t>
                               </m:r>
                             </m:e>
                           </m:acc>
@@ -18312,7 +18345,7 @@
             </p:txBody>
           </p:sp>
         </mc:Choice>
-        <mc:Fallback xmlns="">
+        <mc:Fallback>
           <p:sp>
             <p:nvSpPr>
               <p:cNvPr id="3" name="Content Placeholder 2"/>
@@ -18966,6 +18999,13 @@
   <p:clrMapOvr>
     <a:masterClrMapping/>
   </p:clrMapOvr>
+  <p:timing>
+    <p:tnLst>
+      <p:par>
+        <p:cTn id="1" dur="indefinite" restart="never" nodeType="tmRoot"/>
+      </p:par>
+    </p:tnLst>
+  </p:timing>
 </p:sld>
 </file>
 
@@ -20276,6 +20316,13 @@
   <p:clrMapOvr>
     <a:masterClrMapping/>
   </p:clrMapOvr>
+  <p:timing>
+    <p:tnLst>
+      <p:par>
+        <p:cTn id="1" dur="indefinite" restart="never" nodeType="tmRoot"/>
+      </p:par>
+    </p:tnLst>
+  </p:timing>
 </p:sld>
 </file>
 
@@ -21112,6 +21159,13 @@
   <p:clrMapOvr>
     <a:masterClrMapping/>
   </p:clrMapOvr>
+  <p:timing>
+    <p:tnLst>
+      <p:par>
+        <p:cTn id="1" dur="indefinite" restart="never" nodeType="tmRoot"/>
+      </p:par>
+    </p:tnLst>
+  </p:timing>
 </p:sld>
 </file>
 
@@ -21966,6 +22020,13 @@
   <p:clrMapOvr>
     <a:masterClrMapping/>
   </p:clrMapOvr>
+  <p:timing>
+    <p:tnLst>
+      <p:par>
+        <p:cTn id="1" dur="indefinite" restart="never" nodeType="tmRoot"/>
+      </p:par>
+    </p:tnLst>
+  </p:timing>
 </p:sld>
 </file>
 
@@ -22858,6 +22919,13 @@
   <p:clrMapOvr>
     <a:masterClrMapping/>
   </p:clrMapOvr>
+  <p:timing>
+    <p:tnLst>
+      <p:par>
+        <p:cTn id="1" dur="indefinite" restart="never" nodeType="tmRoot"/>
+      </p:par>
+    </p:tnLst>
+  </p:timing>
 </p:sld>
 </file>
 
@@ -23265,6 +23333,13 @@
   <p:clrMapOvr>
     <a:masterClrMapping/>
   </p:clrMapOvr>
+  <p:timing>
+    <p:tnLst>
+      <p:par>
+        <p:cTn id="1" dur="indefinite" restart="never" nodeType="tmRoot"/>
+      </p:par>
+    </p:tnLst>
+  </p:timing>
 </p:sld>
 </file>
 
@@ -24076,6 +24151,13 @@
   <p:clrMapOvr>
     <a:masterClrMapping/>
   </p:clrMapOvr>
+  <p:timing>
+    <p:tnLst>
+      <p:par>
+        <p:cTn id="1" dur="indefinite" restart="never" nodeType="tmRoot"/>
+      </p:par>
+    </p:tnLst>
+  </p:timing>
 </p:sld>
 </file>
 
@@ -24850,6 +24932,13 @@
   <p:clrMapOvr>
     <a:masterClrMapping/>
   </p:clrMapOvr>
+  <p:timing>
+    <p:tnLst>
+      <p:par>
+        <p:cTn id="1" dur="indefinite" restart="never" nodeType="tmRoot"/>
+      </p:par>
+    </p:tnLst>
+  </p:timing>
 </p:sld>
 </file>
 

</xml_diff>